<commit_message>
1. Updated gtube technical specification document.
</commit_message>
<xml_diff>
--- a/gtube-technical-specification/figures/Diagrams.pptx
+++ b/gtube-technical-specification/figures/Diagrams.pptx
@@ -290,7 +290,7 @@
             <a:fld id="{B0FD5A88-CC59-BB42-B4D1-739EC8275BA3}" type="datetimeFigureOut">
               <a:rPr lang="en-US" smtClean="0"/>
               <a:pPr/>
-              <a:t>8/5/10</a:t>
+              <a:t>8/27/10</a:t>
             </a:fld>
             <a:endParaRPr lang="en-US"/>
           </a:p>
@@ -457,7 +457,7 @@
             <a:fld id="{B0FD5A88-CC59-BB42-B4D1-739EC8275BA3}" type="datetimeFigureOut">
               <a:rPr lang="en-US" smtClean="0"/>
               <a:pPr/>
-              <a:t>8/5/10</a:t>
+              <a:t>8/27/10</a:t>
             </a:fld>
             <a:endParaRPr lang="en-US"/>
           </a:p>
@@ -634,7 +634,7 @@
             <a:fld id="{B0FD5A88-CC59-BB42-B4D1-739EC8275BA3}" type="datetimeFigureOut">
               <a:rPr lang="en-US" smtClean="0"/>
               <a:pPr/>
-              <a:t>8/5/10</a:t>
+              <a:t>8/27/10</a:t>
             </a:fld>
             <a:endParaRPr lang="en-US"/>
           </a:p>
@@ -801,7 +801,7 @@
             <a:fld id="{B0FD5A88-CC59-BB42-B4D1-739EC8275BA3}" type="datetimeFigureOut">
               <a:rPr lang="en-US" smtClean="0"/>
               <a:pPr/>
-              <a:t>8/5/10</a:t>
+              <a:t>8/27/10</a:t>
             </a:fld>
             <a:endParaRPr lang="en-US"/>
           </a:p>
@@ -1044,7 +1044,7 @@
             <a:fld id="{B0FD5A88-CC59-BB42-B4D1-739EC8275BA3}" type="datetimeFigureOut">
               <a:rPr lang="en-US" smtClean="0"/>
               <a:pPr/>
-              <a:t>8/5/10</a:t>
+              <a:t>8/27/10</a:t>
             </a:fld>
             <a:endParaRPr lang="en-US"/>
           </a:p>
@@ -1329,7 +1329,7 @@
             <a:fld id="{B0FD5A88-CC59-BB42-B4D1-739EC8275BA3}" type="datetimeFigureOut">
               <a:rPr lang="en-US" smtClean="0"/>
               <a:pPr/>
-              <a:t>8/5/10</a:t>
+              <a:t>8/27/10</a:t>
             </a:fld>
             <a:endParaRPr lang="en-US"/>
           </a:p>
@@ -1748,7 +1748,7 @@
             <a:fld id="{B0FD5A88-CC59-BB42-B4D1-739EC8275BA3}" type="datetimeFigureOut">
               <a:rPr lang="en-US" smtClean="0"/>
               <a:pPr/>
-              <a:t>8/5/10</a:t>
+              <a:t>8/27/10</a:t>
             </a:fld>
             <a:endParaRPr lang="en-US"/>
           </a:p>
@@ -1863,7 +1863,7 @@
             <a:fld id="{B0FD5A88-CC59-BB42-B4D1-739EC8275BA3}" type="datetimeFigureOut">
               <a:rPr lang="en-US" smtClean="0"/>
               <a:pPr/>
-              <a:t>8/5/10</a:t>
+              <a:t>8/27/10</a:t>
             </a:fld>
             <a:endParaRPr lang="en-US"/>
           </a:p>
@@ -1955,7 +1955,7 @@
             <a:fld id="{B0FD5A88-CC59-BB42-B4D1-739EC8275BA3}" type="datetimeFigureOut">
               <a:rPr lang="en-US" smtClean="0"/>
               <a:pPr/>
-              <a:t>8/5/10</a:t>
+              <a:t>8/27/10</a:t>
             </a:fld>
             <a:endParaRPr lang="en-US"/>
           </a:p>
@@ -2229,7 +2229,7 @@
             <a:fld id="{B0FD5A88-CC59-BB42-B4D1-739EC8275BA3}" type="datetimeFigureOut">
               <a:rPr lang="en-US" smtClean="0"/>
               <a:pPr/>
-              <a:t>8/5/10</a:t>
+              <a:t>8/27/10</a:t>
             </a:fld>
             <a:endParaRPr lang="en-US"/>
           </a:p>
@@ -2479,7 +2479,7 @@
             <a:fld id="{B0FD5A88-CC59-BB42-B4D1-739EC8275BA3}" type="datetimeFigureOut">
               <a:rPr lang="en-US" smtClean="0"/>
               <a:pPr/>
-              <a:t>8/5/10</a:t>
+              <a:t>8/27/10</a:t>
             </a:fld>
             <a:endParaRPr lang="en-US"/>
           </a:p>
@@ -2689,7 +2689,7 @@
             <a:fld id="{B0FD5A88-CC59-BB42-B4D1-739EC8275BA3}" type="datetimeFigureOut">
               <a:rPr lang="en-US" smtClean="0"/>
               <a:pPr/>
-              <a:t>8/5/10</a:t>
+              <a:t>8/27/10</a:t>
             </a:fld>
             <a:endParaRPr lang="en-US"/>
           </a:p>
@@ -3648,23 +3648,7 @@
                   <a:schemeClr val="tx1"/>
                 </a:solidFill>
               </a:rPr>
-              <a:t>Lower </a:t>
-            </a:r>
-            <a:r>
-              <a:rPr lang="en-US" sz="1200" dirty="0" smtClean="0">
-                <a:solidFill>
-                  <a:schemeClr val="tx1"/>
-                </a:solidFill>
-              </a:rPr>
-              <a:t>Leve</a:t>
-            </a:r>
-            <a:r>
-              <a:rPr lang="en-US" sz="1200" dirty="0" smtClean="0">
-                <a:solidFill>
-                  <a:schemeClr val="tx1"/>
-                </a:solidFill>
-              </a:rPr>
-              <a:t>l </a:t>
+              <a:t>Lower Level </a:t>
             </a:r>
             <a:r>
               <a:rPr lang="en-US" sz="1200" smtClean="0">
@@ -3672,15 +3656,7 @@
                   <a:schemeClr val="tx1"/>
                 </a:solidFill>
               </a:rPr>
-              <a:t>User Workflow</a:t>
-            </a:r>
-            <a:r>
-              <a:rPr lang="en-US" sz="1200" smtClean="0">
-                <a:solidFill>
-                  <a:schemeClr val="tx1"/>
-                </a:solidFill>
-              </a:rPr>
-              <a:t> </a:t>
+              <a:t>User Workflow </a:t>
             </a:r>
             <a:r>
               <a:rPr lang="en-US" sz="1200" dirty="0" smtClean="0">
@@ -4132,6 +4108,722 @@
           <a:chExt cx="0" cy="0"/>
         </a:xfrm>
       </p:grpSpPr>
+      <p:sp>
+        <p:nvSpPr>
+          <p:cNvPr id="19" name="Rectangle 18"/>
+          <p:cNvSpPr/>
+          <p:nvPr/>
+        </p:nvSpPr>
+        <p:spPr>
+          <a:xfrm>
+            <a:off x="6230532" y="1105032"/>
+            <a:ext cx="2103017" cy="4675768"/>
+          </a:xfrm>
+          <a:prstGeom prst="rect">
+            <a:avLst/>
+          </a:prstGeom>
+          <a:solidFill>
+            <a:schemeClr val="bg1"/>
+          </a:solidFill>
+          <a:ln>
+            <a:solidFill>
+              <a:schemeClr val="tx1"/>
+            </a:solidFill>
+          </a:ln>
+        </p:spPr>
+        <p:style>
+          <a:lnRef idx="1">
+            <a:schemeClr val="accent1"/>
+          </a:lnRef>
+          <a:fillRef idx="3">
+            <a:schemeClr val="accent1"/>
+          </a:fillRef>
+          <a:effectRef idx="2">
+            <a:schemeClr val="accent1"/>
+          </a:effectRef>
+          <a:fontRef idx="minor">
+            <a:schemeClr val="lt1"/>
+          </a:fontRef>
+        </p:style>
+        <p:txBody>
+          <a:bodyPr rtlCol="0" anchor="ctr"/>
+          <a:lstStyle/>
+          <a:p>
+            <a:pPr algn="ctr"/>
+            <a:endParaRPr lang="en-US"/>
+          </a:p>
+        </p:txBody>
+      </p:sp>
+      <p:sp>
+        <p:nvSpPr>
+          <p:cNvPr id="18" name="Rectangle 17"/>
+          <p:cNvSpPr/>
+          <p:nvPr/>
+        </p:nvSpPr>
+        <p:spPr>
+          <a:xfrm>
+            <a:off x="2573101" y="1105032"/>
+            <a:ext cx="3554512" cy="4675768"/>
+          </a:xfrm>
+          <a:prstGeom prst="rect">
+            <a:avLst/>
+          </a:prstGeom>
+          <a:solidFill>
+            <a:schemeClr val="bg1"/>
+          </a:solidFill>
+          <a:ln>
+            <a:solidFill>
+              <a:schemeClr val="tx1"/>
+            </a:solidFill>
+          </a:ln>
+        </p:spPr>
+        <p:style>
+          <a:lnRef idx="1">
+            <a:schemeClr val="accent1"/>
+          </a:lnRef>
+          <a:fillRef idx="3">
+            <a:schemeClr val="accent1"/>
+          </a:fillRef>
+          <a:effectRef idx="2">
+            <a:schemeClr val="accent1"/>
+          </a:effectRef>
+          <a:fontRef idx="minor">
+            <a:schemeClr val="lt1"/>
+          </a:fontRef>
+        </p:style>
+        <p:txBody>
+          <a:bodyPr rtlCol="0" anchor="ctr"/>
+          <a:lstStyle/>
+          <a:p>
+            <a:pPr algn="ctr"/>
+            <a:endParaRPr lang="en-US"/>
+          </a:p>
+        </p:txBody>
+      </p:sp>
+      <p:sp>
+        <p:nvSpPr>
+          <p:cNvPr id="17" name="Rectangle 16"/>
+          <p:cNvSpPr/>
+          <p:nvPr/>
+        </p:nvSpPr>
+        <p:spPr>
+          <a:xfrm>
+            <a:off x="288650" y="1105032"/>
+            <a:ext cx="2103017" cy="4675768"/>
+          </a:xfrm>
+          <a:prstGeom prst="rect">
+            <a:avLst/>
+          </a:prstGeom>
+          <a:solidFill>
+            <a:schemeClr val="bg1"/>
+          </a:solidFill>
+          <a:ln>
+            <a:solidFill>
+              <a:schemeClr val="tx1"/>
+            </a:solidFill>
+          </a:ln>
+        </p:spPr>
+        <p:style>
+          <a:lnRef idx="1">
+            <a:schemeClr val="accent1"/>
+          </a:lnRef>
+          <a:fillRef idx="3">
+            <a:schemeClr val="accent1"/>
+          </a:fillRef>
+          <a:effectRef idx="2">
+            <a:schemeClr val="accent1"/>
+          </a:effectRef>
+          <a:fontRef idx="minor">
+            <a:schemeClr val="lt1"/>
+          </a:fontRef>
+        </p:style>
+        <p:txBody>
+          <a:bodyPr rtlCol="0" anchor="ctr"/>
+          <a:lstStyle/>
+          <a:p>
+            <a:pPr algn="ctr"/>
+            <a:endParaRPr lang="en-US"/>
+          </a:p>
+        </p:txBody>
+      </p:sp>
+      <p:sp>
+        <p:nvSpPr>
+          <p:cNvPr id="2" name="Rectangle 1"/>
+          <p:cNvSpPr/>
+          <p:nvPr/>
+        </p:nvSpPr>
+        <p:spPr>
+          <a:xfrm>
+            <a:off x="870071" y="2440966"/>
+            <a:ext cx="1228822" cy="659720"/>
+          </a:xfrm>
+          <a:prstGeom prst="rect">
+            <a:avLst/>
+          </a:prstGeom>
+          <a:solidFill>
+            <a:schemeClr val="bg1"/>
+          </a:solidFill>
+          <a:ln>
+            <a:solidFill>
+              <a:schemeClr val="tx1"/>
+            </a:solidFill>
+          </a:ln>
+        </p:spPr>
+        <p:style>
+          <a:lnRef idx="1">
+            <a:schemeClr val="accent1"/>
+          </a:lnRef>
+          <a:fillRef idx="3">
+            <a:schemeClr val="accent1"/>
+          </a:fillRef>
+          <a:effectRef idx="2">
+            <a:schemeClr val="accent1"/>
+          </a:effectRef>
+          <a:fontRef idx="minor">
+            <a:schemeClr val="lt1"/>
+          </a:fontRef>
+        </p:style>
+        <p:txBody>
+          <a:bodyPr rtlCol="0" anchor="ctr"/>
+          <a:lstStyle/>
+          <a:p>
+            <a:pPr algn="ctr"/>
+            <a:r>
+              <a:rPr lang="en-US" sz="1200" dirty="0" smtClean="0">
+                <a:solidFill>
+                  <a:schemeClr val="tx1"/>
+                </a:solidFill>
+              </a:rPr>
+              <a:t>Construct Model</a:t>
+            </a:r>
+            <a:endParaRPr lang="en-US" sz="1200" dirty="0">
+              <a:solidFill>
+                <a:schemeClr val="tx1"/>
+              </a:solidFill>
+            </a:endParaRPr>
+          </a:p>
+        </p:txBody>
+      </p:sp>
+      <p:sp>
+        <p:nvSpPr>
+          <p:cNvPr id="3" name="Rectangle 2"/>
+          <p:cNvSpPr/>
+          <p:nvPr/>
+        </p:nvSpPr>
+        <p:spPr>
+          <a:xfrm>
+            <a:off x="2787352" y="2440966"/>
+            <a:ext cx="1360948" cy="659720"/>
+          </a:xfrm>
+          <a:prstGeom prst="rect">
+            <a:avLst/>
+          </a:prstGeom>
+          <a:solidFill>
+            <a:schemeClr val="bg1"/>
+          </a:solidFill>
+          <a:ln>
+            <a:solidFill>
+              <a:schemeClr val="tx1"/>
+            </a:solidFill>
+          </a:ln>
+        </p:spPr>
+        <p:style>
+          <a:lnRef idx="1">
+            <a:schemeClr val="accent1"/>
+          </a:lnRef>
+          <a:fillRef idx="3">
+            <a:schemeClr val="accent1"/>
+          </a:fillRef>
+          <a:effectRef idx="2">
+            <a:schemeClr val="accent1"/>
+          </a:effectRef>
+          <a:fontRef idx="minor">
+            <a:schemeClr val="lt1"/>
+          </a:fontRef>
+        </p:style>
+        <p:txBody>
+          <a:bodyPr rtlCol="0" anchor="ctr"/>
+          <a:lstStyle/>
+          <a:p>
+            <a:pPr algn="ctr"/>
+            <a:r>
+              <a:rPr lang="en-US" sz="1200" dirty="0" smtClean="0">
+                <a:solidFill>
+                  <a:schemeClr val="tx1"/>
+                </a:solidFill>
+              </a:rPr>
+              <a:t>Design Experiment</a:t>
+            </a:r>
+            <a:endParaRPr lang="en-US" sz="1200" dirty="0">
+              <a:solidFill>
+                <a:schemeClr val="tx1"/>
+              </a:solidFill>
+            </a:endParaRPr>
+          </a:p>
+        </p:txBody>
+      </p:sp>
+      <p:sp>
+        <p:nvSpPr>
+          <p:cNvPr id="4" name="Rectangle 3"/>
+          <p:cNvSpPr/>
+          <p:nvPr/>
+        </p:nvSpPr>
+        <p:spPr>
+          <a:xfrm>
+            <a:off x="4506708" y="2440966"/>
+            <a:ext cx="1360948" cy="659720"/>
+          </a:xfrm>
+          <a:prstGeom prst="rect">
+            <a:avLst/>
+          </a:prstGeom>
+          <a:solidFill>
+            <a:schemeClr val="bg1"/>
+          </a:solidFill>
+          <a:ln>
+            <a:solidFill>
+              <a:schemeClr val="tx1"/>
+            </a:solidFill>
+          </a:ln>
+        </p:spPr>
+        <p:style>
+          <a:lnRef idx="1">
+            <a:schemeClr val="accent1"/>
+          </a:lnRef>
+          <a:fillRef idx="3">
+            <a:schemeClr val="accent1"/>
+          </a:fillRef>
+          <a:effectRef idx="2">
+            <a:schemeClr val="accent1"/>
+          </a:effectRef>
+          <a:fontRef idx="minor">
+            <a:schemeClr val="lt1"/>
+          </a:fontRef>
+        </p:style>
+        <p:txBody>
+          <a:bodyPr rtlCol="0" anchor="ctr"/>
+          <a:lstStyle/>
+          <a:p>
+            <a:pPr algn="ctr"/>
+            <a:r>
+              <a:rPr lang="en-US" sz="1200" dirty="0" smtClean="0">
+                <a:solidFill>
+                  <a:schemeClr val="tx1"/>
+                </a:solidFill>
+              </a:rPr>
+              <a:t>Run Simulation</a:t>
+            </a:r>
+            <a:endParaRPr lang="en-US" sz="1200" dirty="0">
+              <a:solidFill>
+                <a:schemeClr val="tx1"/>
+              </a:solidFill>
+            </a:endParaRPr>
+          </a:p>
+        </p:txBody>
+      </p:sp>
+      <p:sp>
+        <p:nvSpPr>
+          <p:cNvPr id="5" name="Rectangle 4"/>
+          <p:cNvSpPr/>
+          <p:nvPr/>
+        </p:nvSpPr>
+        <p:spPr>
+          <a:xfrm>
+            <a:off x="6453031" y="2440966"/>
+            <a:ext cx="1360948" cy="659720"/>
+          </a:xfrm>
+          <a:prstGeom prst="rect">
+            <a:avLst/>
+          </a:prstGeom>
+          <a:solidFill>
+            <a:schemeClr val="bg1"/>
+          </a:solidFill>
+          <a:ln>
+            <a:solidFill>
+              <a:schemeClr val="tx1"/>
+            </a:solidFill>
+          </a:ln>
+        </p:spPr>
+        <p:style>
+          <a:lnRef idx="1">
+            <a:schemeClr val="accent1"/>
+          </a:lnRef>
+          <a:fillRef idx="3">
+            <a:schemeClr val="accent1"/>
+          </a:fillRef>
+          <a:effectRef idx="2">
+            <a:schemeClr val="accent1"/>
+          </a:effectRef>
+          <a:fontRef idx="minor">
+            <a:schemeClr val="lt1"/>
+          </a:fontRef>
+        </p:style>
+        <p:txBody>
+          <a:bodyPr rtlCol="0" anchor="ctr"/>
+          <a:lstStyle/>
+          <a:p>
+            <a:pPr algn="ctr"/>
+            <a:r>
+              <a:rPr lang="en-US" sz="1200" dirty="0" smtClean="0">
+                <a:solidFill>
+                  <a:schemeClr val="tx1"/>
+                </a:solidFill>
+              </a:rPr>
+              <a:t>Output</a:t>
+            </a:r>
+            <a:endParaRPr lang="en-US" sz="1200" dirty="0">
+              <a:solidFill>
+                <a:schemeClr val="tx1"/>
+              </a:solidFill>
+            </a:endParaRPr>
+          </a:p>
+        </p:txBody>
+      </p:sp>
+      <p:sp>
+        <p:nvSpPr>
+          <p:cNvPr id="6" name="Rectangle 5"/>
+          <p:cNvSpPr/>
+          <p:nvPr/>
+        </p:nvSpPr>
+        <p:spPr>
+          <a:xfrm>
+            <a:off x="3521262" y="3591174"/>
+            <a:ext cx="1360948" cy="659720"/>
+          </a:xfrm>
+          <a:prstGeom prst="rect">
+            <a:avLst/>
+          </a:prstGeom>
+          <a:solidFill>
+            <a:schemeClr val="bg1"/>
+          </a:solidFill>
+          <a:ln>
+            <a:solidFill>
+              <a:schemeClr val="tx1"/>
+            </a:solidFill>
+          </a:ln>
+        </p:spPr>
+        <p:style>
+          <a:lnRef idx="1">
+            <a:schemeClr val="accent1"/>
+          </a:lnRef>
+          <a:fillRef idx="3">
+            <a:schemeClr val="accent1"/>
+          </a:fillRef>
+          <a:effectRef idx="2">
+            <a:schemeClr val="accent1"/>
+          </a:effectRef>
+          <a:fontRef idx="minor">
+            <a:schemeClr val="lt1"/>
+          </a:fontRef>
+        </p:style>
+        <p:txBody>
+          <a:bodyPr rtlCol="0" anchor="ctr"/>
+          <a:lstStyle/>
+          <a:p>
+            <a:pPr algn="ctr"/>
+            <a:r>
+              <a:rPr lang="en-US" sz="1200" dirty="0" smtClean="0">
+                <a:solidFill>
+                  <a:schemeClr val="tx1"/>
+                </a:solidFill>
+              </a:rPr>
+              <a:t>Iterators</a:t>
+            </a:r>
+            <a:endParaRPr lang="en-US" sz="1200" dirty="0">
+              <a:solidFill>
+                <a:schemeClr val="tx1"/>
+              </a:solidFill>
+            </a:endParaRPr>
+          </a:p>
+        </p:txBody>
+      </p:sp>
+      <p:cxnSp>
+        <p:nvCxnSpPr>
+          <p:cNvPr id="8" name="Straight Arrow Connector 7"/>
+          <p:cNvCxnSpPr>
+            <a:stCxn id="2" idx="3"/>
+            <a:endCxn id="3" idx="1"/>
+          </p:cNvCxnSpPr>
+          <p:nvPr/>
+        </p:nvCxnSpPr>
+        <p:spPr>
+          <a:xfrm>
+            <a:off x="2098893" y="2770826"/>
+            <a:ext cx="688459" cy="1588"/>
+          </a:xfrm>
+          <a:prstGeom prst="straightConnector1">
+            <a:avLst/>
+          </a:prstGeom>
+          <a:ln>
+            <a:solidFill>
+              <a:schemeClr val="tx1"/>
+            </a:solidFill>
+            <a:tailEnd type="arrow"/>
+          </a:ln>
+        </p:spPr>
+        <p:style>
+          <a:lnRef idx="2">
+            <a:schemeClr val="accent1"/>
+          </a:lnRef>
+          <a:fillRef idx="0">
+            <a:schemeClr val="accent1"/>
+          </a:fillRef>
+          <a:effectRef idx="1">
+            <a:schemeClr val="accent1"/>
+          </a:effectRef>
+          <a:fontRef idx="minor">
+            <a:schemeClr val="tx1"/>
+          </a:fontRef>
+        </p:style>
+      </p:cxnSp>
+      <p:cxnSp>
+        <p:nvCxnSpPr>
+          <p:cNvPr id="10" name="Straight Arrow Connector 9"/>
+          <p:cNvCxnSpPr>
+            <a:stCxn id="3" idx="3"/>
+            <a:endCxn id="4" idx="1"/>
+          </p:cNvCxnSpPr>
+          <p:nvPr/>
+        </p:nvCxnSpPr>
+        <p:spPr>
+          <a:xfrm>
+            <a:off x="4148300" y="2770826"/>
+            <a:ext cx="358408" cy="1588"/>
+          </a:xfrm>
+          <a:prstGeom prst="straightConnector1">
+            <a:avLst/>
+          </a:prstGeom>
+          <a:ln>
+            <a:solidFill>
+              <a:schemeClr val="tx1"/>
+            </a:solidFill>
+            <a:tailEnd type="arrow"/>
+          </a:ln>
+        </p:spPr>
+        <p:style>
+          <a:lnRef idx="2">
+            <a:schemeClr val="accent1"/>
+          </a:lnRef>
+          <a:fillRef idx="0">
+            <a:schemeClr val="accent1"/>
+          </a:fillRef>
+          <a:effectRef idx="1">
+            <a:schemeClr val="accent1"/>
+          </a:effectRef>
+          <a:fontRef idx="minor">
+            <a:schemeClr val="tx1"/>
+          </a:fontRef>
+        </p:style>
+      </p:cxnSp>
+      <p:cxnSp>
+        <p:nvCxnSpPr>
+          <p:cNvPr id="12" name="Straight Arrow Connector 11"/>
+          <p:cNvCxnSpPr>
+            <a:stCxn id="4" idx="3"/>
+            <a:endCxn id="5" idx="1"/>
+          </p:cNvCxnSpPr>
+          <p:nvPr/>
+        </p:nvCxnSpPr>
+        <p:spPr>
+          <a:xfrm>
+            <a:off x="5867656" y="2770826"/>
+            <a:ext cx="585375" cy="1588"/>
+          </a:xfrm>
+          <a:prstGeom prst="straightConnector1">
+            <a:avLst/>
+          </a:prstGeom>
+          <a:ln>
+            <a:solidFill>
+              <a:schemeClr val="tx1"/>
+            </a:solidFill>
+            <a:tailEnd type="arrow"/>
+          </a:ln>
+        </p:spPr>
+        <p:style>
+          <a:lnRef idx="2">
+            <a:schemeClr val="accent1"/>
+          </a:lnRef>
+          <a:fillRef idx="0">
+            <a:schemeClr val="accent1"/>
+          </a:fillRef>
+          <a:effectRef idx="1">
+            <a:schemeClr val="accent1"/>
+          </a:effectRef>
+          <a:fontRef idx="minor">
+            <a:schemeClr val="tx1"/>
+          </a:fontRef>
+        </p:style>
+      </p:cxnSp>
+      <p:cxnSp>
+        <p:nvCxnSpPr>
+          <p:cNvPr id="14" name="Elbow Connector 13"/>
+          <p:cNvCxnSpPr>
+            <a:stCxn id="5" idx="3"/>
+          </p:cNvCxnSpPr>
+          <p:nvPr/>
+        </p:nvCxnSpPr>
+        <p:spPr>
+          <a:xfrm flipH="1">
+            <a:off x="4882210" y="2770826"/>
+            <a:ext cx="2931769" cy="1154511"/>
+          </a:xfrm>
+          <a:prstGeom prst="bentConnector3">
+            <a:avLst>
+              <a:gd name="adj1" fmla="val -7797"/>
+            </a:avLst>
+          </a:prstGeom>
+          <a:ln>
+            <a:solidFill>
+              <a:schemeClr val="tx1"/>
+            </a:solidFill>
+            <a:tailEnd type="arrow"/>
+          </a:ln>
+        </p:spPr>
+        <p:style>
+          <a:lnRef idx="2">
+            <a:schemeClr val="accent1"/>
+          </a:lnRef>
+          <a:fillRef idx="0">
+            <a:schemeClr val="accent1"/>
+          </a:fillRef>
+          <a:effectRef idx="1">
+            <a:schemeClr val="accent1"/>
+          </a:effectRef>
+          <a:fontRef idx="minor">
+            <a:schemeClr val="tx1"/>
+          </a:fontRef>
+        </p:style>
+      </p:cxnSp>
+      <p:cxnSp>
+        <p:nvCxnSpPr>
+          <p:cNvPr id="16" name="Elbow Connector 15"/>
+          <p:cNvCxnSpPr>
+            <a:stCxn id="6" idx="1"/>
+            <a:endCxn id="2" idx="1"/>
+          </p:cNvCxnSpPr>
+          <p:nvPr/>
+        </p:nvCxnSpPr>
+        <p:spPr>
+          <a:xfrm rot="10800000">
+            <a:off x="870072" y="2770826"/>
+            <a:ext cx="2651191" cy="1150208"/>
+          </a:xfrm>
+          <a:prstGeom prst="bentConnector3">
+            <a:avLst>
+              <a:gd name="adj1" fmla="val 108623"/>
+            </a:avLst>
+          </a:prstGeom>
+          <a:ln>
+            <a:solidFill>
+              <a:schemeClr val="tx1"/>
+            </a:solidFill>
+            <a:tailEnd type="arrow"/>
+          </a:ln>
+        </p:spPr>
+        <p:style>
+          <a:lnRef idx="2">
+            <a:schemeClr val="accent1"/>
+          </a:lnRef>
+          <a:fillRef idx="0">
+            <a:schemeClr val="accent1"/>
+          </a:fillRef>
+          <a:effectRef idx="1">
+            <a:schemeClr val="accent1"/>
+          </a:effectRef>
+          <a:fontRef idx="minor">
+            <a:schemeClr val="tx1"/>
+          </a:fontRef>
+        </p:style>
+      </p:cxnSp>
+      <p:sp>
+        <p:nvSpPr>
+          <p:cNvPr id="20" name="TextBox 19"/>
+          <p:cNvSpPr txBox="1"/>
+          <p:nvPr/>
+        </p:nvSpPr>
+        <p:spPr>
+          <a:xfrm>
+            <a:off x="329886" y="700957"/>
+            <a:ext cx="1987558" cy="307777"/>
+          </a:xfrm>
+          <a:prstGeom prst="rect">
+            <a:avLst/>
+          </a:prstGeom>
+          <a:noFill/>
+        </p:spPr>
+        <p:txBody>
+          <a:bodyPr wrap="square" rtlCol="0">
+            <a:spAutoFit/>
+          </a:bodyPr>
+          <a:lstStyle/>
+          <a:p>
+            <a:r>
+              <a:rPr lang="en-US" sz="1400" dirty="0" smtClean="0"/>
+              <a:t>Project Management</a:t>
+            </a:r>
+            <a:endParaRPr lang="en-US" sz="1400" dirty="0"/>
+          </a:p>
+        </p:txBody>
+      </p:sp>
+      <p:sp>
+        <p:nvSpPr>
+          <p:cNvPr id="22" name="TextBox 21"/>
+          <p:cNvSpPr txBox="1"/>
+          <p:nvPr/>
+        </p:nvSpPr>
+        <p:spPr>
+          <a:xfrm>
+            <a:off x="3286307" y="700957"/>
+            <a:ext cx="1987558" cy="307777"/>
+          </a:xfrm>
+          <a:prstGeom prst="rect">
+            <a:avLst/>
+          </a:prstGeom>
+          <a:noFill/>
+        </p:spPr>
+        <p:txBody>
+          <a:bodyPr wrap="square" rtlCol="0">
+            <a:spAutoFit/>
+          </a:bodyPr>
+          <a:lstStyle/>
+          <a:p>
+            <a:r>
+              <a:rPr lang="en-US" sz="1400" dirty="0" smtClean="0"/>
+              <a:t>Simulator Management</a:t>
+            </a:r>
+            <a:endParaRPr lang="en-US" sz="1400" dirty="0"/>
+          </a:p>
+        </p:txBody>
+      </p:sp>
+      <p:sp>
+        <p:nvSpPr>
+          <p:cNvPr id="23" name="TextBox 22"/>
+          <p:cNvSpPr txBox="1"/>
+          <p:nvPr/>
+        </p:nvSpPr>
+        <p:spPr>
+          <a:xfrm>
+            <a:off x="6230532" y="699468"/>
+            <a:ext cx="1987558" cy="307777"/>
+          </a:xfrm>
+          <a:prstGeom prst="rect">
+            <a:avLst/>
+          </a:prstGeom>
+          <a:noFill/>
+        </p:spPr>
+        <p:txBody>
+          <a:bodyPr wrap="square" rtlCol="0">
+            <a:spAutoFit/>
+          </a:bodyPr>
+          <a:lstStyle/>
+          <a:p>
+            <a:r>
+              <a:rPr lang="en-US" sz="1400" dirty="0" smtClean="0"/>
+              <a:t>Atom Management</a:t>
+            </a:r>
+            <a:endParaRPr lang="en-US" sz="1400" dirty="0"/>
+          </a:p>
+        </p:txBody>
+      </p:sp>
     </p:spTree>
   </p:cSld>
   <p:clrMapOvr>

</xml_diff>